<commit_message>
video plugin added, syllabus integrated with bologna information system, untill week-9 content updated.
</commit_message>
<xml_diff>
--- a/docs/week-1/week-1.en.md_word.pptx
+++ b/docs/week-1/week-1.en.md_word.pptx
@@ -4455,7 +4455,7 @@
               <a:rPr>
                 <a:hlinkClick r:id="rId4"/>
               </a:rPr>
-              <a:t>PPTX-MD</a:t>
+              <a:t>DOCX-MD</a:t>
             </a:r>
             <a:r>
               <a:rPr/>
@@ -4464,6 +4464,16 @@
             <a:r>
               <a:rPr>
                 <a:hlinkClick r:id="rId5"/>
+              </a:rPr>
+              <a:t>PPTX-MD</a:t>
+            </a:r>
+            <a:r>
+              <a:rPr/>
+              <a:t>, </a:t>
+            </a:r>
+            <a:r>
+              <a:rPr>
+                <a:hlinkClick r:id="rId6"/>
               </a:rPr>
               <a:t>PPTX-MS</a:t>
             </a:r>

</xml_diff>